<commit_message>
fix screen shot colors
</commit_message>
<xml_diff>
--- a/docs/assets/images/screen.pptx
+++ b/docs/assets/images/screen.pptx
@@ -104,6 +104,11 @@
       </a:defRPr>
     </a:lvl9pPr>
   </p:defaultTextStyle>
+  <p:extLst>
+    <p:ext uri="{EFAFB233-063F-42B5-8137-9DF3F51BA10A}">
+      <p15:sldGuideLst xmlns:p15="http://schemas.microsoft.com/office/powerpoint/2012/main"/>
+    </p:ext>
+  </p:extLst>
 </p:presentation>
 </file>
 
@@ -254,7 +259,7 @@
           <a:p>
             <a:fld id="{B76407AE-879F-4E54-8C59-C6F811377882}" type="datetimeFigureOut">
               <a:rPr lang="en-US" smtClean="0"/>
-              <a:t>3/3/2021</a:t>
+              <a:t>7/10/2021</a:t>
             </a:fld>
             <a:endParaRPr lang="en-US"/>
           </a:p>
@@ -452,7 +457,7 @@
           <a:p>
             <a:fld id="{B76407AE-879F-4E54-8C59-C6F811377882}" type="datetimeFigureOut">
               <a:rPr lang="en-US" smtClean="0"/>
-              <a:t>3/3/2021</a:t>
+              <a:t>7/10/2021</a:t>
             </a:fld>
             <a:endParaRPr lang="en-US"/>
           </a:p>
@@ -660,7 +665,7 @@
           <a:p>
             <a:fld id="{B76407AE-879F-4E54-8C59-C6F811377882}" type="datetimeFigureOut">
               <a:rPr lang="en-US" smtClean="0"/>
-              <a:t>3/3/2021</a:t>
+              <a:t>7/10/2021</a:t>
             </a:fld>
             <a:endParaRPr lang="en-US"/>
           </a:p>
@@ -858,7 +863,7 @@
           <a:p>
             <a:fld id="{B76407AE-879F-4E54-8C59-C6F811377882}" type="datetimeFigureOut">
               <a:rPr lang="en-US" smtClean="0"/>
-              <a:t>3/3/2021</a:t>
+              <a:t>7/10/2021</a:t>
             </a:fld>
             <a:endParaRPr lang="en-US"/>
           </a:p>
@@ -1133,7 +1138,7 @@
           <a:p>
             <a:fld id="{B76407AE-879F-4E54-8C59-C6F811377882}" type="datetimeFigureOut">
               <a:rPr lang="en-US" smtClean="0"/>
-              <a:t>3/3/2021</a:t>
+              <a:t>7/10/2021</a:t>
             </a:fld>
             <a:endParaRPr lang="en-US"/>
           </a:p>
@@ -1398,7 +1403,7 @@
           <a:p>
             <a:fld id="{B76407AE-879F-4E54-8C59-C6F811377882}" type="datetimeFigureOut">
               <a:rPr lang="en-US" smtClean="0"/>
-              <a:t>3/3/2021</a:t>
+              <a:t>7/10/2021</a:t>
             </a:fld>
             <a:endParaRPr lang="en-US"/>
           </a:p>
@@ -1810,7 +1815,7 @@
           <a:p>
             <a:fld id="{B76407AE-879F-4E54-8C59-C6F811377882}" type="datetimeFigureOut">
               <a:rPr lang="en-US" smtClean="0"/>
-              <a:t>3/3/2021</a:t>
+              <a:t>7/10/2021</a:t>
             </a:fld>
             <a:endParaRPr lang="en-US"/>
           </a:p>
@@ -1951,7 +1956,7 @@
           <a:p>
             <a:fld id="{B76407AE-879F-4E54-8C59-C6F811377882}" type="datetimeFigureOut">
               <a:rPr lang="en-US" smtClean="0"/>
-              <a:t>3/3/2021</a:t>
+              <a:t>7/10/2021</a:t>
             </a:fld>
             <a:endParaRPr lang="en-US"/>
           </a:p>
@@ -2064,7 +2069,7 @@
           <a:p>
             <a:fld id="{B76407AE-879F-4E54-8C59-C6F811377882}" type="datetimeFigureOut">
               <a:rPr lang="en-US" smtClean="0"/>
-              <a:t>3/3/2021</a:t>
+              <a:t>7/10/2021</a:t>
             </a:fld>
             <a:endParaRPr lang="en-US"/>
           </a:p>
@@ -2375,7 +2380,7 @@
           <a:p>
             <a:fld id="{B76407AE-879F-4E54-8C59-C6F811377882}" type="datetimeFigureOut">
               <a:rPr lang="en-US" smtClean="0"/>
-              <a:t>3/3/2021</a:t>
+              <a:t>7/10/2021</a:t>
             </a:fld>
             <a:endParaRPr lang="en-US"/>
           </a:p>
@@ -2663,7 +2668,7 @@
           <a:p>
             <a:fld id="{B76407AE-879F-4E54-8C59-C6F811377882}" type="datetimeFigureOut">
               <a:rPr lang="en-US" smtClean="0"/>
-              <a:t>3/3/2021</a:t>
+              <a:t>7/10/2021</a:t>
             </a:fld>
             <a:endParaRPr lang="en-US"/>
           </a:p>
@@ -2904,7 +2909,7 @@
           <a:p>
             <a:fld id="{B76407AE-879F-4E54-8C59-C6F811377882}" type="datetimeFigureOut">
               <a:rPr lang="en-US" smtClean="0"/>
-              <a:t>3/3/2021</a:t>
+              <a:t>7/10/2021</a:t>
             </a:fld>
             <a:endParaRPr lang="en-US"/>
           </a:p>
@@ -3725,10 +3730,9 @@
           </a:solidFill>
           <a:effectLst>
             <a:glow rad="63500">
-              <a:schemeClr val="accent1">
-                <a:satMod val="175000"/>
+              <a:srgbClr val="1464F4">
                 <a:alpha val="40000"/>
-              </a:schemeClr>
+              </a:srgbClr>
             </a:glow>
             <a:outerShdw blurRad="50800" dist="38100" dir="5400000" algn="t" rotWithShape="0">
               <a:prstClr val="black">
@@ -3774,26 +3778,37 @@
               </a:ext>
             </a:extLst>
           </p:cNvPr>
-          <p:cNvCxnSpPr/>
+          <p:cNvCxnSpPr>
+            <a:cxnSpLocks/>
+            <a:stCxn id="11" idx="1"/>
+          </p:cNvCxnSpPr>
           <p:nvPr/>
         </p:nvCxnSpPr>
         <p:spPr>
           <a:xfrm>
-            <a:off x="5360565" y="4169328"/>
-            <a:ext cx="0" cy="1426129"/>
+            <a:off x="5380125" y="4145190"/>
+            <a:ext cx="0" cy="1455510"/>
           </a:xfrm>
           <a:prstGeom prst="line">
             <a:avLst/>
           </a:prstGeom>
+          <a:ln w="19050"/>
+          <a:effectLst>
+            <a:glow rad="63500">
+              <a:srgbClr val="1464F4">
+                <a:alpha val="40000"/>
+              </a:srgbClr>
+            </a:glow>
+          </a:effectLst>
         </p:spPr>
         <p:style>
-          <a:lnRef idx="1">
+          <a:lnRef idx="2">
             <a:schemeClr val="accent1"/>
           </a:lnRef>
           <a:fillRef idx="0">
             <a:schemeClr val="accent1"/>
           </a:fillRef>
-          <a:effectRef idx="0">
+          <a:effectRef idx="1">
             <a:schemeClr val="accent1"/>
           </a:effectRef>
           <a:fontRef idx="minor">

</xml_diff>